<commit_message>
pre restructuring to two levels of service
</commit_message>
<xml_diff>
--- a/docs/idea.pptx
+++ b/docs/idea.pptx
@@ -4295,13 +4295,8 @@
           <a:p>
             <a:r>
               <a:rPr lang="de-AT" dirty="0"/>
-              <a:t>Network </a:t>
-            </a:r>
-            <a:r>
-              <a:rPr lang="de-AT" dirty="0" err="1"/>
-              <a:t>access</a:t>
-            </a:r>
-            <a:endParaRPr lang="de-AT" dirty="0"/>
+              <a:t>Network Access</a:t>
+            </a:r>
           </a:p>
         </p:txBody>
       </p:sp>
@@ -4389,36 +4384,24 @@
               <a:buChar char="•"/>
             </a:pPr>
             <a:r>
-              <a:rPr lang="de-AT" dirty="0"/>
-              <a:t> </a:t>
-            </a:r>
-            <a:r>
-              <a:rPr lang="de-AT" dirty="0" err="1"/>
-              <a:t>Number</a:t>
-            </a:r>
-            <a:r>
-              <a:rPr lang="de-AT" dirty="0"/>
-              <a:t> </a:t>
-            </a:r>
-            <a:r>
-              <a:rPr lang="de-AT" dirty="0" err="1"/>
-              <a:t>of</a:t>
-            </a:r>
-            <a:r>
-              <a:rPr lang="de-AT" dirty="0"/>
-              <a:t> </a:t>
-            </a:r>
-            <a:r>
-              <a:rPr lang="de-AT" dirty="0" err="1"/>
-              <a:t>computing</a:t>
-            </a:r>
-            <a:r>
-              <a:rPr lang="de-AT" dirty="0"/>
-              <a:t> </a:t>
-            </a:r>
-            <a:r>
-              <a:rPr lang="de-AT" dirty="0" err="1"/>
-              <a:t>steps</a:t>
+              <a:rPr lang="de-AT" dirty="0" err="1"/>
+              <a:t>Some</a:t>
+            </a:r>
+            <a:r>
+              <a:rPr lang="de-AT" dirty="0"/>
+              <a:t> </a:t>
+            </a:r>
+            <a:r>
+              <a:rPr lang="de-AT" dirty="0" err="1"/>
+              <a:t>characteristics</a:t>
+            </a:r>
+            <a:r>
+              <a:rPr lang="de-AT" dirty="0"/>
+              <a:t> </a:t>
+            </a:r>
+            <a:r>
+              <a:rPr lang="de-AT" dirty="0" err="1"/>
+              <a:t>have</a:t>
             </a:r>
             <a:r>
               <a:rPr lang="de-AT" dirty="0"/>
@@ -4434,15 +4417,31 @@
             </a:r>
             <a:r>
               <a:rPr lang="de-AT" dirty="0" err="1"/>
-              <a:t>complete</a:t>
-            </a:r>
-            <a:r>
-              <a:rPr lang="de-AT" dirty="0"/>
-              <a:t> </a:t>
-            </a:r>
-            <a:r>
-              <a:rPr lang="de-AT" dirty="0" err="1"/>
-              <a:t>job</a:t>
+              <a:t>be</a:t>
+            </a:r>
+            <a:r>
+              <a:rPr lang="de-AT" dirty="0"/>
+              <a:t> </a:t>
+            </a:r>
+            <a:r>
+              <a:rPr lang="de-AT" dirty="0" err="1"/>
+              <a:t>known</a:t>
+            </a:r>
+            <a:r>
+              <a:rPr lang="de-AT" dirty="0"/>
+              <a:t> </a:t>
+            </a:r>
+            <a:r>
+              <a:rPr lang="de-AT" dirty="0" err="1"/>
+              <a:t>about</a:t>
+            </a:r>
+            <a:r>
+              <a:rPr lang="de-AT" dirty="0"/>
+              <a:t> </a:t>
+            </a:r>
+            <a:r>
+              <a:rPr lang="de-AT" dirty="0" err="1"/>
+              <a:t>the</a:t>
             </a:r>
             <a:r>
               <a:rPr lang="de-AT" dirty="0"/>
@@ -4451,6 +4450,119 @@
             <a:r>
               <a:rPr lang="de-AT" dirty="0" err="1"/>
               <a:t>required</a:t>
+            </a:r>
+            <a:r>
+              <a:rPr lang="de-AT" dirty="0"/>
+              <a:t> </a:t>
+            </a:r>
+            <a:r>
+              <a:rPr lang="de-AT" dirty="0" err="1"/>
+              <a:t>resources</a:t>
+            </a:r>
+            <a:endParaRPr lang="de-AT" dirty="0"/>
+          </a:p>
+          <a:p>
+            <a:pPr lvl="1">
+              <a:buFont typeface="Arial" panose="020B0604020202020204" pitchFamily="34" charset="0"/>
+              <a:buChar char="•"/>
+            </a:pPr>
+            <a:r>
+              <a:rPr lang="de-AT" dirty="0"/>
+              <a:t>Can </a:t>
+            </a:r>
+            <a:r>
+              <a:rPr lang="de-AT" dirty="0" err="1"/>
+              <a:t>come</a:t>
+            </a:r>
+            <a:r>
+              <a:rPr lang="de-AT" dirty="0"/>
+              <a:t> </a:t>
+            </a:r>
+            <a:r>
+              <a:rPr lang="de-AT" dirty="0" err="1"/>
+              <a:t>from</a:t>
+            </a:r>
+            <a:r>
+              <a:rPr lang="de-AT" dirty="0"/>
+              <a:t> </a:t>
+            </a:r>
+            <a:r>
+              <a:rPr lang="de-AT" dirty="0" err="1"/>
+              <a:t>previously</a:t>
+            </a:r>
+            <a:r>
+              <a:rPr lang="de-AT" dirty="0"/>
+              <a:t> </a:t>
+            </a:r>
+            <a:r>
+              <a:rPr lang="de-AT" dirty="0" err="1"/>
+              <a:t>running</a:t>
+            </a:r>
+            <a:r>
+              <a:rPr lang="de-AT" dirty="0"/>
+              <a:t> </a:t>
+            </a:r>
+            <a:r>
+              <a:rPr lang="de-AT" dirty="0" err="1"/>
+              <a:t>the</a:t>
+            </a:r>
+            <a:r>
+              <a:rPr lang="de-AT" dirty="0"/>
+              <a:t> </a:t>
+            </a:r>
+            <a:r>
+              <a:rPr lang="de-AT" dirty="0" err="1"/>
+              <a:t>jobs</a:t>
+            </a:r>
+            <a:r>
+              <a:rPr lang="de-AT" dirty="0"/>
+              <a:t> (and </a:t>
+            </a:r>
+            <a:r>
+              <a:rPr lang="de-AT" dirty="0" err="1"/>
+              <a:t>now</a:t>
+            </a:r>
+            <a:r>
+              <a:rPr lang="de-AT" dirty="0"/>
+              <a:t> </a:t>
+            </a:r>
+            <a:r>
+              <a:rPr lang="de-AT" dirty="0" err="1"/>
+              <a:t>redistributing</a:t>
+            </a:r>
+            <a:r>
+              <a:rPr lang="de-AT" dirty="0"/>
+              <a:t> </a:t>
+            </a:r>
+            <a:r>
+              <a:rPr lang="de-AT" dirty="0" err="1"/>
+              <a:t>the</a:t>
+            </a:r>
+            <a:r>
+              <a:rPr lang="de-AT" dirty="0"/>
+              <a:t> </a:t>
+            </a:r>
+            <a:r>
+              <a:rPr lang="de-AT" dirty="0" err="1"/>
+              <a:t>jobs</a:t>
+            </a:r>
+            <a:r>
+              <a:rPr lang="de-AT" dirty="0"/>
+              <a:t>)</a:t>
+            </a:r>
+          </a:p>
+          <a:p>
+            <a:pPr lvl="1">
+              <a:buFont typeface="Arial" panose="020B0604020202020204" pitchFamily="34" charset="0"/>
+              <a:buChar char="•"/>
+            </a:pPr>
+            <a:r>
+              <a:rPr lang="de-AT" dirty="0"/>
+              <a:t>Static code </a:t>
+            </a:r>
+            <a:r>
+              <a:rPr lang="de-AT" dirty="0" err="1"/>
+              <a:t>analysis</a:t>
             </a:r>
             <a:endParaRPr lang="de-AT" dirty="0"/>
           </a:p>
@@ -4465,87 +4577,28 @@
             </a:r>
             <a:r>
               <a:rPr lang="de-AT" dirty="0" err="1"/>
-              <a:t>During</a:t>
-            </a:r>
-            <a:r>
-              <a:rPr lang="de-AT" dirty="0"/>
-              <a:t> </a:t>
-            </a:r>
-            <a:r>
-              <a:rPr lang="de-AT" dirty="0" err="1"/>
-              <a:t>simulations</a:t>
-            </a:r>
-            <a:r>
-              <a:rPr lang="de-AT" dirty="0"/>
-              <a:t> </a:t>
-            </a:r>
-            <a:r>
-              <a:rPr lang="de-AT" dirty="0" err="1"/>
-              <a:t>request</a:t>
-            </a:r>
-            <a:r>
-              <a:rPr lang="de-AT" dirty="0"/>
-              <a:t> </a:t>
-            </a:r>
-            <a:r>
-              <a:rPr lang="de-AT" dirty="0" err="1"/>
-              <a:t>resources</a:t>
-            </a:r>
-            <a:endParaRPr lang="de-AT" dirty="0"/>
-          </a:p>
-          <a:p>
-            <a:pPr>
-              <a:buFont typeface="Arial" panose="020B0604020202020204" pitchFamily="34" charset="0"/>
-              <a:buChar char="•"/>
-            </a:pPr>
-            <a:r>
-              <a:rPr lang="de-AT" dirty="0"/>
-              <a:t> </a:t>
-            </a:r>
-            <a:r>
-              <a:rPr lang="de-AT" dirty="0" err="1"/>
-              <a:t>complete</a:t>
-            </a:r>
-            <a:r>
-              <a:rPr lang="de-AT" dirty="0"/>
-              <a:t> </a:t>
-            </a:r>
-            <a:r>
-              <a:rPr lang="de-AT" dirty="0" err="1"/>
-              <a:t>job</a:t>
-            </a:r>
-            <a:r>
-              <a:rPr lang="de-AT" dirty="0"/>
-              <a:t> </a:t>
-            </a:r>
-            <a:r>
-              <a:rPr lang="de-AT" dirty="0" err="1"/>
-              <a:t>with</a:t>
-            </a:r>
-            <a:r>
-              <a:rPr lang="de-AT" dirty="0"/>
-              <a:t> </a:t>
-            </a:r>
-            <a:r>
-              <a:rPr lang="de-AT" dirty="0" err="1"/>
-              <a:t>given</a:t>
-            </a:r>
-            <a:r>
-              <a:rPr lang="de-AT" dirty="0"/>
-              <a:t> </a:t>
-            </a:r>
-            <a:r>
-              <a:rPr lang="de-AT" dirty="0" err="1"/>
-              <a:t>resources</a:t>
-            </a:r>
-            <a:endParaRPr lang="de-AT" dirty="0"/>
-          </a:p>
-          <a:p>
-            <a:pPr>
-              <a:buFont typeface="Arial" panose="020B0604020202020204" pitchFamily="34" charset="0"/>
-              <a:buChar char="•"/>
-            </a:pPr>
-            <a:endParaRPr lang="de-AT" dirty="0"/>
+              <a:t>cpu</a:t>
+            </a:r>
+            <a:r>
+              <a:rPr lang="de-AT" dirty="0"/>
+              <a:t>-/</a:t>
+            </a:r>
+            <a:r>
+              <a:rPr lang="de-AT" dirty="0" err="1"/>
+              <a:t>storage</a:t>
+            </a:r>
+            <a:r>
+              <a:rPr lang="de-AT" dirty="0"/>
+              <a:t>-/</a:t>
+            </a:r>
+            <a:r>
+              <a:rPr lang="de-AT" dirty="0" err="1"/>
+              <a:t>io</a:t>
+            </a:r>
+            <a:r>
+              <a:rPr lang="de-AT" dirty="0"/>
+              <a:t>-heavy</a:t>
+            </a:r>
           </a:p>
           <a:p>
             <a:pPr>

</xml_diff>